<commit_message>
Add the reflect study into ClassLoaderContent.pptx
</commit_message>
<xml_diff>
--- a/JavaStudy/JavaStudyNote/ReflectAndClassLoader/ClassLoaderContent.pptx
+++ b/JavaStudy/JavaStudyNote/ReflectAndClassLoader/ClassLoaderContent.pptx
@@ -10,6 +10,8 @@
     <p:sldId id="258" r:id="rId4"/>
     <p:sldId id="259" r:id="rId5"/>
     <p:sldId id="260" r:id="rId6"/>
+    <p:sldId id="261" r:id="rId7"/>
+    <p:sldId id="262" r:id="rId8"/>
   </p:sldIdLst>
   <p:sldSz cx="12192000" cy="6858000"/>
   <p:notesSz cx="6858000" cy="9144000"/>
@@ -263,7 +265,7 @@
           <a:p>
             <a:fld id="{6ACE98E3-1695-42A0-8E3E-CBA5A937348C}" type="datetimeFigureOut">
               <a:rPr lang="zh-TW" altLang="en-US" smtClean="0"/>
-              <a:t>2023/2/21</a:t>
+              <a:t>2023/2/24</a:t>
             </a:fld>
             <a:endParaRPr lang="zh-TW" altLang="en-US"/>
           </a:p>
@@ -461,7 +463,7 @@
           <a:p>
             <a:fld id="{6ACE98E3-1695-42A0-8E3E-CBA5A937348C}" type="datetimeFigureOut">
               <a:rPr lang="zh-TW" altLang="en-US" smtClean="0"/>
-              <a:t>2023/2/21</a:t>
+              <a:t>2023/2/24</a:t>
             </a:fld>
             <a:endParaRPr lang="zh-TW" altLang="en-US"/>
           </a:p>
@@ -669,7 +671,7 @@
           <a:p>
             <a:fld id="{6ACE98E3-1695-42A0-8E3E-CBA5A937348C}" type="datetimeFigureOut">
               <a:rPr lang="zh-TW" altLang="en-US" smtClean="0"/>
-              <a:t>2023/2/21</a:t>
+              <a:t>2023/2/24</a:t>
             </a:fld>
             <a:endParaRPr lang="zh-TW" altLang="en-US"/>
           </a:p>
@@ -867,7 +869,7 @@
           <a:p>
             <a:fld id="{6ACE98E3-1695-42A0-8E3E-CBA5A937348C}" type="datetimeFigureOut">
               <a:rPr lang="zh-TW" altLang="en-US" smtClean="0"/>
-              <a:t>2023/2/21</a:t>
+              <a:t>2023/2/24</a:t>
             </a:fld>
             <a:endParaRPr lang="zh-TW" altLang="en-US"/>
           </a:p>
@@ -1142,7 +1144,7 @@
           <a:p>
             <a:fld id="{6ACE98E3-1695-42A0-8E3E-CBA5A937348C}" type="datetimeFigureOut">
               <a:rPr lang="zh-TW" altLang="en-US" smtClean="0"/>
-              <a:t>2023/2/21</a:t>
+              <a:t>2023/2/24</a:t>
             </a:fld>
             <a:endParaRPr lang="zh-TW" altLang="en-US"/>
           </a:p>
@@ -1407,7 +1409,7 @@
           <a:p>
             <a:fld id="{6ACE98E3-1695-42A0-8E3E-CBA5A937348C}" type="datetimeFigureOut">
               <a:rPr lang="zh-TW" altLang="en-US" smtClean="0"/>
-              <a:t>2023/2/21</a:t>
+              <a:t>2023/2/24</a:t>
             </a:fld>
             <a:endParaRPr lang="zh-TW" altLang="en-US"/>
           </a:p>
@@ -1819,7 +1821,7 @@
           <a:p>
             <a:fld id="{6ACE98E3-1695-42A0-8E3E-CBA5A937348C}" type="datetimeFigureOut">
               <a:rPr lang="zh-TW" altLang="en-US" smtClean="0"/>
-              <a:t>2023/2/21</a:t>
+              <a:t>2023/2/24</a:t>
             </a:fld>
             <a:endParaRPr lang="zh-TW" altLang="en-US"/>
           </a:p>
@@ -1960,7 +1962,7 @@
           <a:p>
             <a:fld id="{6ACE98E3-1695-42A0-8E3E-CBA5A937348C}" type="datetimeFigureOut">
               <a:rPr lang="zh-TW" altLang="en-US" smtClean="0"/>
-              <a:t>2023/2/21</a:t>
+              <a:t>2023/2/24</a:t>
             </a:fld>
             <a:endParaRPr lang="zh-TW" altLang="en-US"/>
           </a:p>
@@ -2073,7 +2075,7 @@
           <a:p>
             <a:fld id="{6ACE98E3-1695-42A0-8E3E-CBA5A937348C}" type="datetimeFigureOut">
               <a:rPr lang="zh-TW" altLang="en-US" smtClean="0"/>
-              <a:t>2023/2/21</a:t>
+              <a:t>2023/2/24</a:t>
             </a:fld>
             <a:endParaRPr lang="zh-TW" altLang="en-US"/>
           </a:p>
@@ -2384,7 +2386,7 @@
           <a:p>
             <a:fld id="{6ACE98E3-1695-42A0-8E3E-CBA5A937348C}" type="datetimeFigureOut">
               <a:rPr lang="zh-TW" altLang="en-US" smtClean="0"/>
-              <a:t>2023/2/21</a:t>
+              <a:t>2023/2/24</a:t>
             </a:fld>
             <a:endParaRPr lang="zh-TW" altLang="en-US"/>
           </a:p>
@@ -2672,7 +2674,7 @@
           <a:p>
             <a:fld id="{6ACE98E3-1695-42A0-8E3E-CBA5A937348C}" type="datetimeFigureOut">
               <a:rPr lang="zh-TW" altLang="en-US" smtClean="0"/>
-              <a:t>2023/2/21</a:t>
+              <a:t>2023/2/24</a:t>
             </a:fld>
             <a:endParaRPr lang="zh-TW" altLang="en-US"/>
           </a:p>
@@ -2913,7 +2915,7 @@
           <a:p>
             <a:fld id="{6ACE98E3-1695-42A0-8E3E-CBA5A937348C}" type="datetimeFigureOut">
               <a:rPr lang="zh-TW" altLang="en-US" smtClean="0"/>
-              <a:t>2023/2/21</a:t>
+              <a:t>2023/2/24</a:t>
             </a:fld>
             <a:endParaRPr lang="zh-TW" altLang="en-US"/>
           </a:p>
@@ -4446,6 +4448,368 @@
 </p:sld>
 </file>
 
+<file path=ppt/slides/slide6.xml><?xml version="1.0" encoding="utf-8"?>
+<p:sld xmlns:a="http://schemas.openxmlformats.org/drawingml/2006/main" xmlns:r="http://schemas.openxmlformats.org/officeDocument/2006/relationships" xmlns:p="http://schemas.openxmlformats.org/presentationml/2006/main">
+  <p:cSld>
+    <p:spTree>
+      <p:nvGrpSpPr>
+        <p:cNvPr id="1" name=""/>
+        <p:cNvGrpSpPr/>
+        <p:nvPr/>
+      </p:nvGrpSpPr>
+      <p:grpSpPr>
+        <a:xfrm>
+          <a:off x="0" y="0"/>
+          <a:ext cx="0" cy="0"/>
+          <a:chOff x="0" y="0"/>
+          <a:chExt cx="0" cy="0"/>
+        </a:xfrm>
+      </p:grpSpPr>
+      <p:sp>
+        <p:nvSpPr>
+          <p:cNvPr id="4" name="文字方塊 3">
+            <a:extLst>
+              <a:ext uri="{FF2B5EF4-FFF2-40B4-BE49-F238E27FC236}">
+                <a16:creationId xmlns:a16="http://schemas.microsoft.com/office/drawing/2014/main" id="{4FB61A87-78E5-41E0-82D0-96F60B0F5CCB}"/>
+              </a:ext>
+            </a:extLst>
+          </p:cNvPr>
+          <p:cNvSpPr txBox="1"/>
+          <p:nvPr/>
+        </p:nvSpPr>
+        <p:spPr>
+          <a:xfrm>
+            <a:off x="467360" y="294640"/>
+            <a:ext cx="11419840" cy="2308324"/>
+          </a:xfrm>
+          <a:prstGeom prst="rect">
+            <a:avLst/>
+          </a:prstGeom>
+          <a:noFill/>
+        </p:spPr>
+        <p:txBody>
+          <a:bodyPr wrap="square" rtlCol="0">
+            <a:spAutoFit/>
+          </a:bodyPr>
+          <a:lstStyle/>
+          <a:p>
+            <a:r>
+              <a:rPr lang="en-US" altLang="zh-TW" b="1" u="sng" dirty="0"/>
+              <a:t>Proxy</a:t>
+            </a:r>
+          </a:p>
+          <a:p>
+            <a:endParaRPr lang="en-US" altLang="zh-TW" dirty="0"/>
+          </a:p>
+          <a:p>
+            <a:endParaRPr lang="en-US" altLang="zh-TW" dirty="0"/>
+          </a:p>
+          <a:p>
+            <a:endParaRPr lang="en-US" altLang="zh-TW" dirty="0"/>
+          </a:p>
+          <a:p>
+            <a:pPr marL="342900" indent="-342900">
+              <a:buAutoNum type="arabicPeriod"/>
+            </a:pPr>
+            <a:r>
+              <a:rPr lang="zh-CN" altLang="en-US" dirty="0"/>
+              <a:t>對象創建的方法 </a:t>
+            </a:r>
+            <a:r>
+              <a:rPr lang="en-US" altLang="zh-TW" dirty="0"/>
+              <a:t>static Object </a:t>
+            </a:r>
+            <a:r>
+              <a:rPr lang="en-US" altLang="zh-TW" dirty="0" err="1"/>
+              <a:t>newProxyInstance</a:t>
+            </a:r>
+            <a:r>
+              <a:rPr lang="en-US" altLang="zh-TW" dirty="0"/>
+              <a:t>(</a:t>
+            </a:r>
+            <a:r>
+              <a:rPr lang="en-US" altLang="zh-TW" dirty="0" err="1"/>
+              <a:t>ClassLoader</a:t>
+            </a:r>
+            <a:r>
+              <a:rPr lang="en-US" altLang="zh-TW" dirty="0"/>
+              <a:t> </a:t>
+            </a:r>
+            <a:r>
+              <a:rPr lang="en-US" altLang="zh-TW" dirty="0" err="1"/>
+              <a:t>loader,Class</a:t>
+            </a:r>
+            <a:r>
+              <a:rPr lang="en-US" altLang="zh-TW" dirty="0"/>
+              <a:t>&lt;?&gt;[] interfaces, </a:t>
+            </a:r>
+            <a:r>
+              <a:rPr lang="en-US" altLang="zh-TW" dirty="0" err="1"/>
+              <a:t>InvocationHandler</a:t>
+            </a:r>
+            <a:r>
+              <a:rPr lang="en-US" altLang="zh-TW" dirty="0"/>
+              <a:t> h)</a:t>
+            </a:r>
+          </a:p>
+          <a:p>
+            <a:pPr marL="342900" indent="-342900">
+              <a:buAutoNum type="arabicPeriod"/>
+            </a:pPr>
+            <a:endParaRPr lang="en-US" altLang="zh-TW" dirty="0"/>
+          </a:p>
+          <a:p>
+            <a:pPr marL="342900" indent="-342900">
+              <a:buAutoNum type="arabicPeriod"/>
+            </a:pPr>
+            <a:endParaRPr lang="en-US" altLang="zh-TW" dirty="0"/>
+          </a:p>
+          <a:p>
+            <a:pPr marL="342900" indent="-342900">
+              <a:buAutoNum type="arabicPeriod"/>
+            </a:pPr>
+            <a:r>
+              <a:rPr lang="en-US" altLang="zh-TW" dirty="0"/>
+              <a:t> </a:t>
+            </a:r>
+            <a:r>
+              <a:rPr lang="zh-CN" altLang="en-US" dirty="0"/>
+              <a:t>實現</a:t>
+            </a:r>
+            <a:r>
+              <a:rPr lang="en-US" altLang="zh-TW" dirty="0" err="1"/>
+              <a:t>InvocationHandler</a:t>
+            </a:r>
+            <a:r>
+              <a:rPr lang="zh-CN" altLang="en-US" dirty="0"/>
+              <a:t>接口</a:t>
+            </a:r>
+            <a:r>
+              <a:rPr lang="en-US" altLang="zh-CN" dirty="0"/>
+              <a:t>,   </a:t>
+            </a:r>
+            <a:r>
+              <a:rPr lang="zh-CN" altLang="en-US" dirty="0"/>
+              <a:t>重寫</a:t>
+            </a:r>
+            <a:r>
+              <a:rPr lang="en-US" altLang="zh-CN" dirty="0"/>
+              <a:t>invoke</a:t>
+            </a:r>
+            <a:r>
+              <a:rPr lang="zh-CN" altLang="en-US" dirty="0"/>
+              <a:t>方法</a:t>
+            </a:r>
+            <a:endParaRPr lang="zh-TW" altLang="en-US" dirty="0"/>
+          </a:p>
+        </p:txBody>
+      </p:sp>
+    </p:spTree>
+    <p:extLst>
+      <p:ext uri="{BB962C8B-B14F-4D97-AF65-F5344CB8AC3E}">
+        <p14:creationId xmlns:p14="http://schemas.microsoft.com/office/powerpoint/2010/main" val="2890884585"/>
+      </p:ext>
+    </p:extLst>
+  </p:cSld>
+  <p:clrMapOvr>
+    <a:masterClrMapping/>
+  </p:clrMapOvr>
+</p:sld>
+</file>
+
+<file path=ppt/slides/slide7.xml><?xml version="1.0" encoding="utf-8"?>
+<p:sld xmlns:a="http://schemas.openxmlformats.org/drawingml/2006/main" xmlns:r="http://schemas.openxmlformats.org/officeDocument/2006/relationships" xmlns:p="http://schemas.openxmlformats.org/presentationml/2006/main">
+  <p:cSld>
+    <p:spTree>
+      <p:nvGrpSpPr>
+        <p:cNvPr id="1" name=""/>
+        <p:cNvGrpSpPr/>
+        <p:nvPr/>
+      </p:nvGrpSpPr>
+      <p:grpSpPr>
+        <a:xfrm>
+          <a:off x="0" y="0"/>
+          <a:ext cx="0" cy="0"/>
+          <a:chOff x="0" y="0"/>
+          <a:chExt cx="0" cy="0"/>
+        </a:xfrm>
+      </p:grpSpPr>
+      <p:sp>
+        <p:nvSpPr>
+          <p:cNvPr id="4" name="文字方塊 3">
+            <a:extLst>
+              <a:ext uri="{FF2B5EF4-FFF2-40B4-BE49-F238E27FC236}">
+                <a16:creationId xmlns:a16="http://schemas.microsoft.com/office/drawing/2014/main" id="{2E8264FC-6B52-406A-A8F3-E3BC52CE76B1}"/>
+              </a:ext>
+            </a:extLst>
+          </p:cNvPr>
+          <p:cNvSpPr txBox="1"/>
+          <p:nvPr/>
+        </p:nvSpPr>
+        <p:spPr>
+          <a:xfrm>
+            <a:off x="264160" y="304800"/>
+            <a:ext cx="10505440" cy="2585323"/>
+          </a:xfrm>
+          <a:prstGeom prst="rect">
+            <a:avLst/>
+          </a:prstGeom>
+          <a:noFill/>
+        </p:spPr>
+        <p:txBody>
+          <a:bodyPr wrap="square" rtlCol="0">
+            <a:spAutoFit/>
+          </a:bodyPr>
+          <a:lstStyle/>
+          <a:p>
+            <a:r>
+              <a:rPr lang="zh-CN" altLang="en-US" b="1" u="sng" dirty="0"/>
+              <a:t>反射獲取獲取範型數據</a:t>
+            </a:r>
+            <a:endParaRPr lang="en-US" altLang="zh-CN" b="1" u="sng" dirty="0"/>
+          </a:p>
+          <a:p>
+            <a:endParaRPr lang="en-US" altLang="zh-TW" b="1" u="sng" dirty="0"/>
+          </a:p>
+          <a:p>
+            <a:r>
+              <a:rPr lang="en-US" altLang="zh-TW" dirty="0"/>
+              <a:t>	</a:t>
+            </a:r>
+            <a:r>
+              <a:rPr lang="en-US" altLang="zh-CN" dirty="0"/>
+              <a:t>1.   </a:t>
+            </a:r>
+            <a:r>
+              <a:rPr lang="zh-CN" altLang="en-US" dirty="0"/>
+              <a:t>獲取範型類型</a:t>
+            </a:r>
+            <a:endParaRPr lang="en-US" altLang="zh-CN" dirty="0"/>
+          </a:p>
+          <a:p>
+            <a:r>
+              <a:rPr lang="en-US" altLang="zh-TW" dirty="0"/>
+              <a:t>		</a:t>
+            </a:r>
+            <a:r>
+              <a:rPr lang="en-US" altLang="zh-TW" dirty="0" err="1"/>
+              <a:t>getGenericType</a:t>
+            </a:r>
+            <a:r>
+              <a:rPr lang="en-US" altLang="zh-TW" dirty="0"/>
+              <a:t>()       ---      </a:t>
+            </a:r>
+            <a:r>
+              <a:rPr lang="zh-CN" altLang="en-US" dirty="0"/>
+              <a:t>通過</a:t>
+            </a:r>
+            <a:r>
+              <a:rPr lang="en-US" altLang="zh-CN" dirty="0"/>
+              <a:t>Field</a:t>
+            </a:r>
+            <a:r>
+              <a:rPr lang="zh-CN" altLang="en-US" dirty="0"/>
+              <a:t>類獲取範型</a:t>
+            </a:r>
+            <a:r>
+              <a:rPr lang="en-US" altLang="zh-CN" dirty="0"/>
+              <a:t>,  </a:t>
+            </a:r>
+            <a:r>
+              <a:rPr lang="zh-CN" altLang="en-US" dirty="0"/>
+              <a:t>如果不是範型就會使用</a:t>
+            </a:r>
+            <a:r>
+              <a:rPr lang="en-US" altLang="zh-CN" dirty="0" err="1"/>
+              <a:t>getType</a:t>
+            </a:r>
+            <a:r>
+              <a:rPr lang="zh-CN" altLang="en-US"/>
+              <a:t>方法</a:t>
+            </a:r>
+            <a:endParaRPr lang="en-US" altLang="zh-CN" dirty="0"/>
+          </a:p>
+          <a:p>
+            <a:r>
+              <a:rPr lang="en-US" altLang="zh-TW" dirty="0"/>
+              <a:t>		</a:t>
+            </a:r>
+          </a:p>
+          <a:p>
+            <a:endParaRPr lang="en-US" altLang="zh-TW" dirty="0"/>
+          </a:p>
+          <a:p>
+            <a:r>
+              <a:rPr lang="en-US" altLang="zh-TW" dirty="0"/>
+              <a:t>	</a:t>
+            </a:r>
+            <a:r>
+              <a:rPr lang="en-US" altLang="zh-CN" dirty="0"/>
+              <a:t>2.  </a:t>
+            </a:r>
+            <a:r>
+              <a:rPr lang="zh-CN" altLang="en-US" dirty="0"/>
+              <a:t>獲取範型類型使用的類</a:t>
+            </a:r>
+            <a:r>
+              <a:rPr lang="en-US" altLang="zh-CN" dirty="0" err="1"/>
+              <a:t>ParameterizedType</a:t>
+            </a:r>
+            <a:endParaRPr lang="en-US" altLang="zh-CN" dirty="0"/>
+          </a:p>
+          <a:p>
+            <a:r>
+              <a:rPr lang="en-US" altLang="zh-TW" dirty="0"/>
+              <a:t>		</a:t>
+            </a:r>
+            <a:r>
+              <a:rPr lang="en-US" altLang="zh-TW" dirty="0" err="1"/>
+              <a:t>getActualTypeArguments</a:t>
+            </a:r>
+            <a:r>
+              <a:rPr lang="en-US" altLang="zh-TW" dirty="0"/>
+              <a:t>  --- </a:t>
+            </a:r>
+            <a:r>
+              <a:rPr lang="zh-CN" altLang="en-US" dirty="0"/>
+              <a:t>獲取範型類型</a:t>
+            </a:r>
+            <a:endParaRPr lang="en-US" altLang="zh-CN" dirty="0"/>
+          </a:p>
+          <a:p>
+            <a:r>
+              <a:rPr lang="en-US" altLang="zh-TW" dirty="0"/>
+              <a:t>		</a:t>
+            </a:r>
+            <a:r>
+              <a:rPr lang="en-US" altLang="zh-CN" dirty="0" err="1"/>
+              <a:t>getRawType</a:t>
+            </a:r>
+            <a:r>
+              <a:rPr lang="en-US" altLang="zh-CN" dirty="0"/>
+              <a:t>            ---   </a:t>
+            </a:r>
+            <a:r>
+              <a:rPr lang="zh-CN" altLang="en-US" dirty="0"/>
+              <a:t>獲取範型原來的類型</a:t>
+            </a:r>
+            <a:endParaRPr lang="zh-TW" altLang="en-US" dirty="0"/>
+          </a:p>
+        </p:txBody>
+      </p:sp>
+    </p:spTree>
+    <p:extLst>
+      <p:ext uri="{BB962C8B-B14F-4D97-AF65-F5344CB8AC3E}">
+        <p14:creationId xmlns:p14="http://schemas.microsoft.com/office/powerpoint/2010/main" val="1837172588"/>
+      </p:ext>
+    </p:extLst>
+  </p:cSld>
+  <p:clrMapOvr>
+    <a:masterClrMapping/>
+  </p:clrMapOvr>
+</p:sld>
+</file>
+
 <file path=ppt/theme/theme1.xml><?xml version="1.0" encoding="utf-8"?>
 <a:theme xmlns:a="http://schemas.openxmlformats.org/drawingml/2006/main" name="Office 佈景主題">
   <a:themeElements>

</xml_diff>